<commit_message>
[ghlee] 1. DAVIS_Protocol_RestAPI_v1.0_2022419.docx 추가
</commit_message>
<xml_diff>
--- a/document/기타/DAVIS_flow_20220415.pptx
+++ b/document/기타/DAVIS_flow_20220415.pptx
@@ -3362,13 +3362,14 @@
           <a:lstStyle/>
           <a:p>
             <a:r>
-              <a:rPr lang="en-US" altLang="ko-KR" dirty="0"/>
+              <a:rPr lang="en-US" altLang="ko-KR"/>
               <a:t>DAVIS</a:t>
             </a:r>
             <a:r>
-              <a:rPr lang="ko-KR" altLang="en-US" dirty="0"/>
+              <a:rPr lang="ko-KR" altLang="en-US"/>
               <a:t> 구조</a:t>
             </a:r>
+            <a:endParaRPr lang="ko-KR" altLang="en-US" dirty="0"/>
           </a:p>
         </p:txBody>
       </p:sp>
@@ -3394,12 +3395,8 @@
           <a:lstStyle/>
           <a:p>
             <a:r>
-              <a:rPr lang="ko-KR" altLang="en-US" dirty="0"/>
-              <a:t>상황 별 </a:t>
-            </a:r>
-            <a:r>
               <a:rPr lang="en-US" altLang="ko-KR" dirty="0"/>
-              <a:t>Flow</a:t>
+              <a:t>Flowchart</a:t>
             </a:r>
             <a:endParaRPr lang="ko-KR" altLang="en-US" dirty="0"/>
           </a:p>

</xml_diff>